<commit_message>
Updated for sprint 4
Signed on to do all the new user stories for this sprint. Mainly because
everyone else has signed on to do something. But if you finish your
tasks early then just put your name down on whatever task.
</commit_message>
<xml_diff>
--- a/New user stories.pptx
+++ b/New user stories.pptx
@@ -221,7 +221,7 @@
           <a:p>
             <a:fld id="{8F62A1AA-067A-4653-B33E-B2E7C9C94C80}" type="datetimeFigureOut">
               <a:rPr lang="en-AU" smtClean="0"/>
-              <a:t>21/09/2016</a:t>
+              <a:t>10/10/2016</a:t>
             </a:fld>
             <a:endParaRPr lang="en-AU"/>
           </a:p>
@@ -3370,7 +3370,7 @@
           <a:p>
             <a:fld id="{F948429C-6762-49E5-8A06-E9E40D1806DA}" type="datetimeFigureOut">
               <a:rPr lang="en-AU" smtClean="0"/>
-              <a:t>21/09/2016</a:t>
+              <a:t>10/10/2016</a:t>
             </a:fld>
             <a:endParaRPr lang="en-AU"/>
           </a:p>
@@ -3540,7 +3540,7 @@
           <a:p>
             <a:fld id="{F948429C-6762-49E5-8A06-E9E40D1806DA}" type="datetimeFigureOut">
               <a:rPr lang="en-AU" smtClean="0"/>
-              <a:t>21/09/2016</a:t>
+              <a:t>10/10/2016</a:t>
             </a:fld>
             <a:endParaRPr lang="en-AU"/>
           </a:p>
@@ -3720,7 +3720,7 @@
           <a:p>
             <a:fld id="{F948429C-6762-49E5-8A06-E9E40D1806DA}" type="datetimeFigureOut">
               <a:rPr lang="en-AU" smtClean="0"/>
-              <a:t>21/09/2016</a:t>
+              <a:t>10/10/2016</a:t>
             </a:fld>
             <a:endParaRPr lang="en-AU"/>
           </a:p>
@@ -3890,7 +3890,7 @@
           <a:p>
             <a:fld id="{F948429C-6762-49E5-8A06-E9E40D1806DA}" type="datetimeFigureOut">
               <a:rPr lang="en-AU" smtClean="0"/>
-              <a:t>21/09/2016</a:t>
+              <a:t>10/10/2016</a:t>
             </a:fld>
             <a:endParaRPr lang="en-AU"/>
           </a:p>
@@ -4136,7 +4136,7 @@
           <a:p>
             <a:fld id="{F948429C-6762-49E5-8A06-E9E40D1806DA}" type="datetimeFigureOut">
               <a:rPr lang="en-AU" smtClean="0"/>
-              <a:t>21/09/2016</a:t>
+              <a:t>10/10/2016</a:t>
             </a:fld>
             <a:endParaRPr lang="en-AU"/>
           </a:p>
@@ -4368,7 +4368,7 @@
           <a:p>
             <a:fld id="{F948429C-6762-49E5-8A06-E9E40D1806DA}" type="datetimeFigureOut">
               <a:rPr lang="en-AU" smtClean="0"/>
-              <a:t>21/09/2016</a:t>
+              <a:t>10/10/2016</a:t>
             </a:fld>
             <a:endParaRPr lang="en-AU"/>
           </a:p>
@@ -4735,7 +4735,7 @@
           <a:p>
             <a:fld id="{F948429C-6762-49E5-8A06-E9E40D1806DA}" type="datetimeFigureOut">
               <a:rPr lang="en-AU" smtClean="0"/>
-              <a:t>21/09/2016</a:t>
+              <a:t>10/10/2016</a:t>
             </a:fld>
             <a:endParaRPr lang="en-AU"/>
           </a:p>
@@ -4853,7 +4853,7 @@
           <a:p>
             <a:fld id="{F948429C-6762-49E5-8A06-E9E40D1806DA}" type="datetimeFigureOut">
               <a:rPr lang="en-AU" smtClean="0"/>
-              <a:t>21/09/2016</a:t>
+              <a:t>10/10/2016</a:t>
             </a:fld>
             <a:endParaRPr lang="en-AU"/>
           </a:p>
@@ -4948,7 +4948,7 @@
           <a:p>
             <a:fld id="{F948429C-6762-49E5-8A06-E9E40D1806DA}" type="datetimeFigureOut">
               <a:rPr lang="en-AU" smtClean="0"/>
-              <a:t>21/09/2016</a:t>
+              <a:t>10/10/2016</a:t>
             </a:fld>
             <a:endParaRPr lang="en-AU"/>
           </a:p>
@@ -5225,7 +5225,7 @@
           <a:p>
             <a:fld id="{F948429C-6762-49E5-8A06-E9E40D1806DA}" type="datetimeFigureOut">
               <a:rPr lang="en-AU" smtClean="0"/>
-              <a:t>21/09/2016</a:t>
+              <a:t>10/10/2016</a:t>
             </a:fld>
             <a:endParaRPr lang="en-AU"/>
           </a:p>
@@ -5478,7 +5478,7 @@
           <a:p>
             <a:fld id="{F948429C-6762-49E5-8A06-E9E40D1806DA}" type="datetimeFigureOut">
               <a:rPr lang="en-AU" smtClean="0"/>
-              <a:t>21/09/2016</a:t>
+              <a:t>10/10/2016</a:t>
             </a:fld>
             <a:endParaRPr lang="en-AU"/>
           </a:p>
@@ -5691,7 +5691,7 @@
           <a:p>
             <a:fld id="{F948429C-6762-49E5-8A06-E9E40D1806DA}" type="datetimeFigureOut">
               <a:rPr lang="en-AU" smtClean="0"/>
-              <a:t>21/09/2016</a:t>
+              <a:t>10/10/2016</a:t>
             </a:fld>
             <a:endParaRPr lang="en-AU"/>
           </a:p>
@@ -13628,16 +13628,16 @@
               <a:buSzPct val="25000"/>
             </a:pPr>
             <a:r>
-              <a:rPr lang="en-US" sz="2000" dirty="0">
-                <a:solidFill>
-                  <a:schemeClr val="dk1"/>
-                </a:solidFill>
-                <a:latin typeface="Calibri"/>
-                <a:ea typeface="Calibri"/>
-                <a:cs typeface="Calibri"/>
-                <a:sym typeface="Calibri"/>
-              </a:rPr>
-              <a:t>2</a:t>
+              <a:rPr lang="en-US" sz="2000" dirty="0" smtClean="0">
+                <a:solidFill>
+                  <a:schemeClr val="dk1"/>
+                </a:solidFill>
+                <a:latin typeface="Calibri"/>
+                <a:ea typeface="Calibri"/>
+                <a:cs typeface="Calibri"/>
+                <a:sym typeface="Calibri"/>
+              </a:rPr>
+              <a:t>1</a:t>
             </a:r>
             <a:endParaRPr lang="en-AU" sz="2000" dirty="0">
               <a:solidFill>
@@ -19441,13 +19441,13 @@
                 <a:buChar char="•"/>
               </a:pPr>
               <a:r>
-                <a:rPr lang="en-AU" sz="2000" dirty="0">
+                <a:rPr lang="en-US" sz="2000" dirty="0" smtClean="0">
                   <a:latin typeface="Calibri"/>
                   <a:ea typeface="Calibri"/>
                   <a:cs typeface="Calibri"/>
                   <a:sym typeface="Calibri"/>
                 </a:rPr>
-                <a:t> Event must exist</a:t>
+                <a:t>Entered value must be positive</a:t>
               </a:r>
             </a:p>
             <a:p>
@@ -19466,8 +19466,18 @@
                   <a:cs typeface="Calibri"/>
                   <a:sym typeface="Calibri"/>
                 </a:rPr>
-                <a:t>Page should ask member how many tickets to reserve</a:t>
+                <a:t>On save it should show on  the attending events page</a:t>
               </a:r>
+            </a:p>
+            <a:p>
+              <a:pPr marL="179387" indent="-179387">
+                <a:buClr>
+                  <a:srgbClr val="000000"/>
+                </a:buClr>
+                <a:buSzPct val="100000"/>
+                <a:buFont typeface="Arial"/>
+                <a:buChar char="•"/>
+              </a:pPr>
               <a:endParaRPr lang="en-AU" sz="2000" dirty="0">
                 <a:latin typeface="Calibri"/>
                 <a:ea typeface="Calibri"/>
@@ -19550,7 +19560,7 @@
                 </a:buClr>
               </a:pPr>
               <a:r>
-                <a:rPr lang="en-US" sz="2000" dirty="0">
+                <a:rPr lang="en-US" sz="2000" dirty="0" smtClean="0">
                   <a:solidFill>
                     <a:srgbClr val="000000"/>
                   </a:solidFill>
@@ -19559,17 +19569,8 @@
                   <a:cs typeface="Calibri"/>
                   <a:sym typeface="Calibri"/>
                 </a:rPr>
-                <a:t>4</a:t>
+                <a:t>2</a:t>
               </a:r>
-              <a:endParaRPr sz="2000" dirty="0">
-                <a:solidFill>
-                  <a:srgbClr val="000000"/>
-                </a:solidFill>
-                <a:latin typeface="Calibri"/>
-                <a:ea typeface="Calibri"/>
-                <a:cs typeface="Calibri"/>
-                <a:sym typeface="Calibri"/>
-              </a:endParaRPr>
             </a:p>
           </p:txBody>
         </p:sp>

</xml_diff>